<commit_message>
Partially finished updating Lec 2
</commit_message>
<xml_diff>
--- a/Computing_NGBiology_Lec2_2015-08-15_CL.pptx
+++ b/Computing_NGBiology_Lec2_2015-08-15_CL.pptx
@@ -148,7 +148,7 @@
   </p:defaultTextStyle>
   <p:extLst>
     <p:ext uri="{EFAFB233-063F-42B5-8137-9DF3F51BA10A}">
-      <p15:sldGuideLst xmlns="" xmlns:p15="http://schemas.microsoft.com/office/powerpoint/2012/main">
+      <p15:sldGuideLst xmlns:p15="http://schemas.microsoft.com/office/powerpoint/2012/main">
         <p15:guide id="1" orient="horz" pos="2160">
           <p15:clr>
             <a:srgbClr val="A4A3A4"/>
@@ -253,7 +253,7 @@
           <a:p>
             <a:fld id="{137B6BC2-2A24-4E4C-99D7-FDA8A3D3EFEB}" type="datetimeFigureOut">
               <a:rPr lang="en-US" smtClean="0"/>
-              <a:t>4/20/16</a:t>
+              <a:t>6/10/2016</a:t>
             </a:fld>
             <a:endParaRPr lang="en-US"/>
           </a:p>
@@ -2098,7 +2098,7 @@
           <a:p>
             <a:fld id="{4251665B-C24A-4702-B522-6A4334602E03}" type="datetimeFigureOut">
               <a:rPr lang="en-US" smtClean="0"/>
-              <a:t>4/20/16</a:t>
+              <a:t>6/10/2016</a:t>
             </a:fld>
             <a:endParaRPr lang="en-US"/>
           </a:p>
@@ -2269,7 +2269,7 @@
             <a:fld id="{8E36636D-D922-432D-A958-524484B5923D}" type="datetimeFigureOut">
               <a:rPr lang="en-US" smtClean="0"/>
               <a:pPr/>
-              <a:t>4/20/16</a:t>
+              <a:t>6/10/2016</a:t>
             </a:fld>
             <a:endParaRPr lang="en-US"/>
           </a:p>
@@ -2451,7 +2451,7 @@
             <a:fld id="{8E36636D-D922-432D-A958-524484B5923D}" type="datetimeFigureOut">
               <a:rPr lang="en-US" smtClean="0"/>
               <a:pPr/>
-              <a:t>4/20/16</a:t>
+              <a:t>6/10/2016</a:t>
             </a:fld>
             <a:endParaRPr lang="en-US"/>
           </a:p>
@@ -2739,7 +2739,7 @@
           <a:p>
             <a:fld id="{4251665B-C24A-4702-B522-6A4334602E03}" type="datetimeFigureOut">
               <a:rPr lang="en-US" smtClean="0"/>
-              <a:t>4/20/16</a:t>
+              <a:t>6/10/2016</a:t>
             </a:fld>
             <a:endParaRPr lang="en-US"/>
           </a:p>
@@ -2948,7 +2948,7 @@
             <a:fld id="{8E36636D-D922-432D-A958-524484B5923D}" type="datetimeFigureOut">
               <a:rPr lang="en-US" smtClean="0"/>
               <a:pPr/>
-              <a:t>4/20/16</a:t>
+              <a:t>6/10/2016</a:t>
             </a:fld>
             <a:endParaRPr lang="en-US"/>
           </a:p>
@@ -3284,7 +3284,7 @@
           <a:p>
             <a:fld id="{4251665B-C24A-4702-B522-6A4334602E03}" type="datetimeFigureOut">
               <a:rPr lang="en-US" smtClean="0"/>
-              <a:t>4/20/16</a:t>
+              <a:t>6/10/2016</a:t>
             </a:fld>
             <a:endParaRPr lang="en-US"/>
           </a:p>
@@ -3560,7 +3560,7 @@
             <a:fld id="{8E36636D-D922-432D-A958-524484B5923D}" type="datetimeFigureOut">
               <a:rPr lang="en-US" smtClean="0"/>
               <a:pPr/>
-              <a:t>4/20/16</a:t>
+              <a:t>6/10/2016</a:t>
             </a:fld>
             <a:endParaRPr lang="en-US"/>
           </a:p>
@@ -3941,7 +3941,7 @@
             <a:fld id="{8E36636D-D922-432D-A958-524484B5923D}" type="datetimeFigureOut">
               <a:rPr lang="en-US" smtClean="0"/>
               <a:pPr/>
-              <a:t>4/20/16</a:t>
+              <a:t>6/10/2016</a:t>
             </a:fld>
             <a:endParaRPr lang="en-US"/>
           </a:p>
@@ -4061,7 +4061,7 @@
             <a:fld id="{8E36636D-D922-432D-A958-524484B5923D}" type="datetimeFigureOut">
               <a:rPr lang="en-US" smtClean="0"/>
               <a:pPr/>
-              <a:t>4/20/16</a:t>
+              <a:t>6/10/2016</a:t>
             </a:fld>
             <a:endParaRPr lang="en-US"/>
           </a:p>
@@ -4234,7 +4234,7 @@
             <a:fld id="{8E36636D-D922-432D-A958-524484B5923D}" type="datetimeFigureOut">
               <a:rPr lang="en-US" smtClean="0"/>
               <a:pPr/>
-              <a:t>4/20/16</a:t>
+              <a:t>6/10/2016</a:t>
             </a:fld>
             <a:endParaRPr lang="en-US"/>
           </a:p>
@@ -4590,7 +4590,7 @@
             <a:fld id="{8E36636D-D922-432D-A958-524484B5923D}" type="datetimeFigureOut">
               <a:rPr lang="en-US" smtClean="0"/>
               <a:pPr/>
-              <a:t>4/20/16</a:t>
+              <a:t>6/10/2016</a:t>
             </a:fld>
             <a:endParaRPr lang="en-US"/>
           </a:p>
@@ -4783,7 +4783,7 @@
             <a:fld id="{8E36636D-D922-432D-A958-524484B5923D}" type="datetimeFigureOut">
               <a:rPr lang="en-US" smtClean="0"/>
               <a:pPr/>
-              <a:t>4/20/16</a:t>
+              <a:t>6/10/2016</a:t>
             </a:fld>
             <a:endParaRPr lang="en-US"/>
           </a:p>
@@ -5141,7 +5141,7 @@
             <a:fld id="{8E36636D-D922-432D-A958-524484B5923D}" type="datetimeFigureOut">
               <a:rPr lang="en-US" smtClean="0"/>
               <a:pPr/>
-              <a:t>4/20/16</a:t>
+              <a:t>6/10/2016</a:t>
             </a:fld>
             <a:endParaRPr lang="en-US"/>
           </a:p>
@@ -5313,7 +5313,7 @@
             <a:fld id="{8E36636D-D922-432D-A958-524484B5923D}" type="datetimeFigureOut">
               <a:rPr lang="en-US" smtClean="0"/>
               <a:pPr/>
-              <a:t>4/20/16</a:t>
+              <a:t>6/10/2016</a:t>
             </a:fld>
             <a:endParaRPr lang="en-US"/>
           </a:p>
@@ -5571,7 +5571,7 @@
             <a:fld id="{8E36636D-D922-432D-A958-524484B5923D}" type="datetimeFigureOut">
               <a:rPr lang="en-US" smtClean="0"/>
               <a:pPr/>
-              <a:t>4/20/16</a:t>
+              <a:t>6/10/2016</a:t>
             </a:fld>
             <a:endParaRPr lang="en-US"/>
           </a:p>
@@ -5823,7 +5823,7 @@
           <a:p>
             <a:fld id="{4251665B-C24A-4702-B522-6A4334602E03}" type="datetimeFigureOut">
               <a:rPr lang="en-US" smtClean="0"/>
-              <a:t>4/20/16</a:t>
+              <a:t>6/10/2016</a:t>
             </a:fld>
             <a:endParaRPr lang="en-US"/>
           </a:p>
@@ -6056,7 +6056,7 @@
             <a:fld id="{8E36636D-D922-432D-A958-524484B5923D}" type="datetimeFigureOut">
               <a:rPr lang="en-US" smtClean="0"/>
               <a:pPr/>
-              <a:t>4/20/16</a:t>
+              <a:t>6/10/2016</a:t>
             </a:fld>
             <a:endParaRPr lang="en-US"/>
           </a:p>
@@ -6405,7 +6405,7 @@
             <a:fld id="{8E36636D-D922-432D-A958-524484B5923D}" type="datetimeFigureOut">
               <a:rPr lang="en-US" smtClean="0"/>
               <a:pPr/>
-              <a:t>4/20/16</a:t>
+              <a:t>6/10/2016</a:t>
             </a:fld>
             <a:endParaRPr lang="en-US"/>
           </a:p>
@@ -6525,7 +6525,7 @@
             <a:fld id="{8E36636D-D922-432D-A958-524484B5923D}" type="datetimeFigureOut">
               <a:rPr lang="en-US" smtClean="0"/>
               <a:pPr/>
-              <a:t>4/20/16</a:t>
+              <a:t>6/10/2016</a:t>
             </a:fld>
             <a:endParaRPr lang="en-US"/>
           </a:p>
@@ -6645,7 +6645,7 @@
             <a:fld id="{8E36636D-D922-432D-A958-524484B5923D}" type="datetimeFigureOut">
               <a:rPr lang="en-US" smtClean="0"/>
               <a:pPr/>
-              <a:t>4/20/16</a:t>
+              <a:t>6/10/2016</a:t>
             </a:fld>
             <a:endParaRPr lang="en-US"/>
           </a:p>
@@ -6931,7 +6931,7 @@
             <a:fld id="{8E36636D-D922-432D-A958-524484B5923D}" type="datetimeFigureOut">
               <a:rPr lang="en-US" smtClean="0"/>
               <a:pPr/>
-              <a:t>4/20/16</a:t>
+              <a:t>6/10/2016</a:t>
             </a:fld>
             <a:endParaRPr lang="en-US"/>
           </a:p>
@@ -7197,7 +7197,7 @@
             <a:fld id="{8E36636D-D922-432D-A958-524484B5923D}" type="datetimeFigureOut">
               <a:rPr lang="en-US" smtClean="0"/>
               <a:pPr/>
-              <a:t>4/20/16</a:t>
+              <a:t>6/10/2016</a:t>
             </a:fld>
             <a:endParaRPr lang="en-US"/>
           </a:p>
@@ -7413,7 +7413,7 @@
             <a:fld id="{8E36636D-D922-432D-A958-524484B5923D}" type="datetimeFigureOut">
               <a:rPr lang="en-US" smtClean="0"/>
               <a:pPr/>
-              <a:t>4/20/16</a:t>
+              <a:t>6/10/2016</a:t>
             </a:fld>
             <a:endParaRPr lang="en-US"/>
           </a:p>
@@ -8018,7 +8018,7 @@
             <a:fld id="{8E36636D-D922-432D-A958-524484B5923D}" type="datetimeFigureOut">
               <a:rPr lang="en-US" smtClean="0"/>
               <a:pPr/>
-              <a:t>4/20/16</a:t>
+              <a:t>6/10/2016</a:t>
             </a:fld>
             <a:endParaRPr lang="en-US"/>
           </a:p>
@@ -8615,7 +8615,7 @@
   <p:timing>
     <p:tnLst>
       <p:par>
-        <p:cTn xmlns:p14="http://schemas.microsoft.com/office/powerpoint/2010/main" id="1" dur="indefinite" restart="never" nodeType="tmRoot"/>
+        <p:cTn id="1" dur="indefinite" restart="never" nodeType="tmRoot"/>
       </p:par>
     </p:tnLst>
   </p:timing>
@@ -8727,7 +8727,7 @@
   <p:timing>
     <p:tnLst>
       <p:par>
-        <p:cTn xmlns:p14="http://schemas.microsoft.com/office/powerpoint/2010/main" id="1" dur="indefinite" restart="never" nodeType="tmRoot"/>
+        <p:cTn id="1" dur="indefinite" restart="never" nodeType="tmRoot"/>
       </p:par>
     </p:tnLst>
   </p:timing>
@@ -8888,7 +8888,7 @@
   <p:timing>
     <p:tnLst>
       <p:par>
-        <p:cTn xmlns:p14="http://schemas.microsoft.com/office/powerpoint/2010/main" id="1" dur="indefinite" restart="never" nodeType="tmRoot"/>
+        <p:cTn id="1" dur="indefinite" restart="never" nodeType="tmRoot"/>
       </p:par>
     </p:tnLst>
   </p:timing>
@@ -8973,7 +8973,7 @@
   <p:timing>
     <p:tnLst>
       <p:par>
-        <p:cTn xmlns:p14="http://schemas.microsoft.com/office/powerpoint/2010/main" id="1" dur="indefinite" restart="never" nodeType="tmRoot"/>
+        <p:cTn id="1" dur="indefinite" restart="never" nodeType="tmRoot"/>
       </p:par>
     </p:tnLst>
   </p:timing>
@@ -9365,8 +9365,21 @@
                   <a:schemeClr val="tx1"/>
                 </a:solidFill>
               </a:rPr>
-              <a:t> commit</a:t>
-            </a:r>
+              <a:t> </a:t>
+            </a:r>
+            <a:r>
+              <a:rPr lang="en-US" dirty="0" smtClean="0">
+                <a:solidFill>
+                  <a:schemeClr val="tx1"/>
+                </a:solidFill>
+              </a:rPr>
+              <a:t>commit –m “commit message”</a:t>
+            </a:r>
+            <a:endParaRPr lang="en-US" dirty="0" smtClean="0">
+              <a:solidFill>
+                <a:schemeClr val="tx1"/>
+              </a:solidFill>
+            </a:endParaRPr>
           </a:p>
           <a:p>
             <a:pPr marL="201168" lvl="1" indent="0">
@@ -9446,7 +9459,7 @@
   <p:timing>
     <p:tnLst>
       <p:par>
-        <p:cTn xmlns:p14="http://schemas.microsoft.com/office/powerpoint/2010/main" id="1" dur="indefinite" restart="never" nodeType="tmRoot"/>
+        <p:cTn id="1" dur="indefinite" restart="never" nodeType="tmRoot"/>
       </p:par>
     </p:tnLst>
   </p:timing>
@@ -9769,7 +9782,7 @@
   <p:timing>
     <p:tnLst>
       <p:par>
-        <p:cTn xmlns:p14="http://schemas.microsoft.com/office/powerpoint/2010/main" id="1" dur="indefinite" restart="never" nodeType="tmRoot"/>
+        <p:cTn id="1" dur="indefinite" restart="never" nodeType="tmRoot"/>
       </p:par>
     </p:tnLst>
   </p:timing>
@@ -10152,7 +10165,7 @@
   <p:timing>
     <p:tnLst>
       <p:par>
-        <p:cTn xmlns:p14="http://schemas.microsoft.com/office/powerpoint/2010/main" id="1" dur="indefinite" restart="never" nodeType="tmRoot"/>
+        <p:cTn id="1" dur="indefinite" restart="never" nodeType="tmRoot"/>
       </p:par>
     </p:tnLst>
   </p:timing>
@@ -10446,7 +10459,7 @@
   <p:timing>
     <p:tnLst>
       <p:par>
-        <p:cTn xmlns:p14="http://schemas.microsoft.com/office/powerpoint/2010/main" id="1" dur="indefinite" restart="never" nodeType="tmRoot"/>
+        <p:cTn id="1" dur="indefinite" restart="never" nodeType="tmRoot"/>
       </p:par>
     </p:tnLst>
   </p:timing>
@@ -10805,7 +10818,7 @@
   <p:timing>
     <p:tnLst>
       <p:par>
-        <p:cTn xmlns:p14="http://schemas.microsoft.com/office/powerpoint/2010/main" id="1" dur="indefinite" restart="never" nodeType="tmRoot"/>
+        <p:cTn id="1" dur="indefinite" restart="never" nodeType="tmRoot"/>
       </p:par>
     </p:tnLst>
   </p:timing>
@@ -10926,7 +10939,7 @@
   <p:timing>
     <p:tnLst>
       <p:par>
-        <p:cTn xmlns:p14="http://schemas.microsoft.com/office/powerpoint/2010/main" id="1" dur="indefinite" restart="never" nodeType="tmRoot"/>
+        <p:cTn id="1" dur="indefinite" restart="never" nodeType="tmRoot"/>
       </p:par>
     </p:tnLst>
   </p:timing>
@@ -11015,7 +11028,7 @@
   <p:timing>
     <p:tnLst>
       <p:par>
-        <p:cTn xmlns:p14="http://schemas.microsoft.com/office/powerpoint/2010/main" id="1" dur="indefinite" restart="never" nodeType="tmRoot"/>
+        <p:cTn id="1" dur="indefinite" restart="never" nodeType="tmRoot"/>
       </p:par>
     </p:tnLst>
   </p:timing>
@@ -11120,7 +11133,7 @@
   <p:timing>
     <p:tnLst>
       <p:par>
-        <p:cTn xmlns:p14="http://schemas.microsoft.com/office/powerpoint/2010/main" id="1" dur="indefinite" restart="never" nodeType="tmRoot"/>
+        <p:cTn id="1" dur="indefinite" restart="never" nodeType="tmRoot"/>
       </p:par>
     </p:tnLst>
   </p:timing>
@@ -11209,7 +11222,7 @@
   <p:timing>
     <p:tnLst>
       <p:par>
-        <p:cTn xmlns:p14="http://schemas.microsoft.com/office/powerpoint/2010/main" id="1" dur="indefinite" restart="never" nodeType="tmRoot"/>
+        <p:cTn id="1" dur="indefinite" restart="never" nodeType="tmRoot"/>
       </p:par>
     </p:tnLst>
   </p:timing>
@@ -11351,7 +11364,7 @@
   <p:timing>
     <p:tnLst>
       <p:par>
-        <p:cTn xmlns:p14="http://schemas.microsoft.com/office/powerpoint/2010/main" id="1" dur="indefinite" restart="never" nodeType="tmRoot"/>
+        <p:cTn id="1" dur="indefinite" restart="never" nodeType="tmRoot"/>
       </p:par>
     </p:tnLst>
   </p:timing>
@@ -11477,7 +11490,7 @@
   <p:timing>
     <p:tnLst>
       <p:par>
-        <p:cTn xmlns:p14="http://schemas.microsoft.com/office/powerpoint/2010/main" id="1" dur="indefinite" restart="never" nodeType="tmRoot"/>
+        <p:cTn id="1" dur="indefinite" restart="never" nodeType="tmRoot"/>
       </p:par>
     </p:tnLst>
   </p:timing>
@@ -11637,7 +11650,7 @@
   <p:timing>
     <p:tnLst>
       <p:par>
-        <p:cTn xmlns:p14="http://schemas.microsoft.com/office/powerpoint/2010/main" id="1" dur="indefinite" restart="never" nodeType="tmRoot"/>
+        <p:cTn id="1" dur="indefinite" restart="never" nodeType="tmRoot"/>
       </p:par>
     </p:tnLst>
   </p:timing>
@@ -11765,7 +11778,7 @@
   <p:timing>
     <p:tnLst>
       <p:par>
-        <p:cTn xmlns:p14="http://schemas.microsoft.com/office/powerpoint/2010/main" id="1" dur="indefinite" restart="never" nodeType="tmRoot"/>
+        <p:cTn id="1" dur="indefinite" restart="never" nodeType="tmRoot"/>
       </p:par>
     </p:tnLst>
   </p:timing>
@@ -11912,7 +11925,7 @@
   <p:timing>
     <p:tnLst>
       <p:par>
-        <p:cTn xmlns:p14="http://schemas.microsoft.com/office/powerpoint/2010/main" id="1" dur="indefinite" restart="never" nodeType="tmRoot"/>
+        <p:cTn id="1" dur="indefinite" restart="never" nodeType="tmRoot"/>
       </p:par>
     </p:tnLst>
   </p:timing>
@@ -12069,7 +12082,7 @@
   <p:timing>
     <p:tnLst>
       <p:par>
-        <p:cTn xmlns:p14="http://schemas.microsoft.com/office/powerpoint/2010/main" id="1" dur="indefinite" restart="never" nodeType="tmRoot"/>
+        <p:cTn id="1" dur="indefinite" restart="never" nodeType="tmRoot"/>
       </p:par>
     </p:tnLst>
   </p:timing>
@@ -12235,7 +12248,7 @@
   <p:timing>
     <p:tnLst>
       <p:par>
-        <p:cTn xmlns:p14="http://schemas.microsoft.com/office/powerpoint/2010/main" id="1" dur="indefinite" restart="never" nodeType="tmRoot"/>
+        <p:cTn id="1" dur="indefinite" restart="never" nodeType="tmRoot"/>
       </p:par>
     </p:tnLst>
   </p:timing>
@@ -12375,7 +12388,7 @@
   <p:timing>
     <p:tnLst>
       <p:par>
-        <p:cTn xmlns:p14="http://schemas.microsoft.com/office/powerpoint/2010/main" id="1" dur="indefinite" restart="never" nodeType="tmRoot"/>
+        <p:cTn id="1" dur="indefinite" restart="never" nodeType="tmRoot"/>
       </p:par>
     </p:tnLst>
   </p:timing>
@@ -12569,7 +12582,7 @@
   <p:timing>
     <p:tnLst>
       <p:par>
-        <p:cTn xmlns:p14="http://schemas.microsoft.com/office/powerpoint/2010/main" id="1" dur="indefinite" restart="never" nodeType="tmRoot"/>
+        <p:cTn id="1" dur="indefinite" restart="never" nodeType="tmRoot"/>
       </p:par>
     </p:tnLst>
   </p:timing>
@@ -12813,7 +12826,7 @@
   <p:timing>
     <p:tnLst>
       <p:par>
-        <p:cTn xmlns:p14="http://schemas.microsoft.com/office/powerpoint/2010/main" id="1" dur="indefinite" restart="never" nodeType="tmRoot"/>
+        <p:cTn id="1" dur="indefinite" restart="never" nodeType="tmRoot"/>
       </p:par>
     </p:tnLst>
   </p:timing>
@@ -12963,7 +12976,7 @@
   <p:timing>
     <p:tnLst>
       <p:par>
-        <p:cTn xmlns:p14="http://schemas.microsoft.com/office/powerpoint/2010/main" id="1" dur="indefinite" restart="never" nodeType="tmRoot"/>
+        <p:cTn id="1" dur="indefinite" restart="never" nodeType="tmRoot"/>
       </p:par>
     </p:tnLst>
   </p:timing>
@@ -13136,7 +13149,7 @@
   <p:timing>
     <p:tnLst>
       <p:par>
-        <p:cTn xmlns:p14="http://schemas.microsoft.com/office/powerpoint/2010/main" id="1" dur="indefinite" restart="never" nodeType="tmRoot"/>
+        <p:cTn id="1" dur="indefinite" restart="never" nodeType="tmRoot"/>
       </p:par>
     </p:tnLst>
   </p:timing>
@@ -13288,7 +13301,7 @@
   <p:timing>
     <p:tnLst>
       <p:par>
-        <p:cTn xmlns:p14="http://schemas.microsoft.com/office/powerpoint/2010/main" id="1" dur="indefinite" restart="never" nodeType="tmRoot"/>
+        <p:cTn id="1" dur="indefinite" restart="never" nodeType="tmRoot"/>
       </p:par>
     </p:tnLst>
   </p:timing>
@@ -13447,7 +13460,7 @@
   <p:timing>
     <p:tnLst>
       <p:par>
-        <p:cTn xmlns:p14="http://schemas.microsoft.com/office/powerpoint/2010/main" id="1" dur="indefinite" restart="never" nodeType="tmRoot"/>
+        <p:cTn id="1" dur="indefinite" restart="never" nodeType="tmRoot"/>
       </p:par>
     </p:tnLst>
   </p:timing>
@@ -13609,7 +13622,7 @@
   <p:timing>
     <p:tnLst>
       <p:par>
-        <p:cTn xmlns:p14="http://schemas.microsoft.com/office/powerpoint/2010/main" id="1" dur="indefinite" restart="never" nodeType="tmRoot"/>
+        <p:cTn id="1" dur="indefinite" restart="never" nodeType="tmRoot"/>
       </p:par>
     </p:tnLst>
   </p:timing>
@@ -13718,7 +13731,7 @@
   <p:timing>
     <p:tnLst>
       <p:par>
-        <p:cTn xmlns:p14="http://schemas.microsoft.com/office/powerpoint/2010/main" id="1" dur="indefinite" restart="never" nodeType="tmRoot"/>
+        <p:cTn id="1" dur="indefinite" restart="never" nodeType="tmRoot"/>
       </p:par>
     </p:tnLst>
   </p:timing>
@@ -13873,7 +13886,7 @@
   <p:timing>
     <p:tnLst>
       <p:par>
-        <p:cTn xmlns:p14="http://schemas.microsoft.com/office/powerpoint/2010/main" id="1" dur="indefinite" restart="never" nodeType="tmRoot"/>
+        <p:cTn id="1" dur="indefinite" restart="never" nodeType="tmRoot"/>
       </p:par>
     </p:tnLst>
   </p:timing>
@@ -14050,7 +14063,7 @@
   <p:timing>
     <p:tnLst>
       <p:par>
-        <p:cTn xmlns:p14="http://schemas.microsoft.com/office/powerpoint/2010/main" id="1" dur="indefinite" restart="never" nodeType="tmRoot"/>
+        <p:cTn id="1" dur="indefinite" restart="never" nodeType="tmRoot"/>
       </p:par>
     </p:tnLst>
   </p:timing>
@@ -14161,7 +14174,7 @@
   <p:timing>
     <p:tnLst>
       <p:par>
-        <p:cTn xmlns:p14="http://schemas.microsoft.com/office/powerpoint/2010/main" id="1" dur="indefinite" restart="never" nodeType="tmRoot"/>
+        <p:cTn id="1" dur="indefinite" restart="never" nodeType="tmRoot"/>
       </p:par>
     </p:tnLst>
   </p:timing>
@@ -14272,7 +14285,7 @@
   <p:timing>
     <p:tnLst>
       <p:par>
-        <p:cTn xmlns:p14="http://schemas.microsoft.com/office/powerpoint/2010/main" id="1" dur="indefinite" restart="never" nodeType="tmRoot"/>
+        <p:cTn id="1" dur="indefinite" restart="never" nodeType="tmRoot"/>
       </p:par>
     </p:tnLst>
   </p:timing>
@@ -14389,7 +14402,7 @@
   <p:timing>
     <p:tnLst>
       <p:par>
-        <p:cTn xmlns:p14="http://schemas.microsoft.com/office/powerpoint/2010/main" id="1" dur="indefinite" restart="never" nodeType="tmRoot"/>
+        <p:cTn id="1" dur="indefinite" restart="never" nodeType="tmRoot"/>
       </p:par>
     </p:tnLst>
   </p:timing>
@@ -14503,7 +14516,7 @@
   <p:timing>
     <p:tnLst>
       <p:par>
-        <p:cTn xmlns:p14="http://schemas.microsoft.com/office/powerpoint/2010/main" id="1" dur="indefinite" restart="never" nodeType="tmRoot"/>
+        <p:cTn id="1" dur="indefinite" restart="never" nodeType="tmRoot"/>
       </p:par>
     </p:tnLst>
   </p:timing>
@@ -14609,7 +14622,7 @@
   <p:timing>
     <p:tnLst>
       <p:par>
-        <p:cTn xmlns:p14="http://schemas.microsoft.com/office/powerpoint/2010/main" id="1" dur="indefinite" restart="never" nodeType="tmRoot"/>
+        <p:cTn id="1" dur="indefinite" restart="never" nodeType="tmRoot"/>
       </p:par>
     </p:tnLst>
   </p:timing>
@@ -14718,7 +14731,7 @@
   <p:timing>
     <p:tnLst>
       <p:par>
-        <p:cTn xmlns:p14="http://schemas.microsoft.com/office/powerpoint/2010/main" id="1" dur="indefinite" restart="never" nodeType="tmRoot"/>
+        <p:cTn id="1" dur="indefinite" restart="never" nodeType="tmRoot"/>
       </p:par>
     </p:tnLst>
   </p:timing>
@@ -15102,7 +15115,7 @@
   <p:timing>
     <p:tnLst>
       <p:par>
-        <p:cTn xmlns:p14="http://schemas.microsoft.com/office/powerpoint/2010/main" id="1" dur="indefinite" restart="never" nodeType="tmRoot">
+        <p:cTn id="1" dur="indefinite" restart="never" nodeType="tmRoot">
           <p:childTnLst>
             <p:seq concurrent="1" nextAc="seek">
               <p:cTn id="2" dur="indefinite" nodeType="mainSeq">
@@ -15671,7 +15684,7 @@
   <p:timing>
     <p:tnLst>
       <p:par>
-        <p:cTn xmlns:p14="http://schemas.microsoft.com/office/powerpoint/2010/main" id="1" dur="indefinite" restart="never" nodeType="tmRoot"/>
+        <p:cTn id="1" dur="indefinite" restart="never" nodeType="tmRoot"/>
       </p:par>
     </p:tnLst>
   </p:timing>
@@ -16154,7 +16167,7 @@
   <a:extraClrSchemeLst/>
   <a:extLst>
     <a:ext uri="{05A4C25C-085E-4340-85A3-A5531E510DB2}">
-      <thm15:themeFamily xmlns="" xmlns:thm15="http://schemas.microsoft.com/office/thememl/2012/main" name="Retrospect" id="{5F128B03-DCCA-4EEB-AB3B-CF2899314A46}" vid="{9CC26709-368C-4D72-9060-94E5B3FF3CD6}"/>
+      <thm15:themeFamily xmlns:thm15="http://schemas.microsoft.com/office/thememl/2012/main" name="Retrospect" id="{5F128B03-DCCA-4EEB-AB3B-CF2899314A46}" vid="{9CC26709-368C-4D72-9060-94E5B3FF3CD6}"/>
     </a:ext>
   </a:extLst>
 </a:theme>

</xml_diff>

<commit_message>
More updates to Lec2
</commit_message>
<xml_diff>
--- a/Computing_NGBiology_Lec2_2015-08-15_CL.pptx
+++ b/Computing_NGBiology_Lec2_2015-08-15_CL.pptx
@@ -253,7 +253,7 @@
           <a:p>
             <a:fld id="{137B6BC2-2A24-4E4C-99D7-FDA8A3D3EFEB}" type="datetimeFigureOut">
               <a:rPr lang="en-US" smtClean="0"/>
-              <a:t>6/10/2016</a:t>
+              <a:t>6/14/2016</a:t>
             </a:fld>
             <a:endParaRPr lang="en-US"/>
           </a:p>
@@ -2098,7 +2098,7 @@
           <a:p>
             <a:fld id="{4251665B-C24A-4702-B522-6A4334602E03}" type="datetimeFigureOut">
               <a:rPr lang="en-US" smtClean="0"/>
-              <a:t>6/10/2016</a:t>
+              <a:t>6/14/2016</a:t>
             </a:fld>
             <a:endParaRPr lang="en-US"/>
           </a:p>
@@ -2269,7 +2269,7 @@
             <a:fld id="{8E36636D-D922-432D-A958-524484B5923D}" type="datetimeFigureOut">
               <a:rPr lang="en-US" smtClean="0"/>
               <a:pPr/>
-              <a:t>6/10/2016</a:t>
+              <a:t>6/14/2016</a:t>
             </a:fld>
             <a:endParaRPr lang="en-US"/>
           </a:p>
@@ -2451,7 +2451,7 @@
             <a:fld id="{8E36636D-D922-432D-A958-524484B5923D}" type="datetimeFigureOut">
               <a:rPr lang="en-US" smtClean="0"/>
               <a:pPr/>
-              <a:t>6/10/2016</a:t>
+              <a:t>6/14/2016</a:t>
             </a:fld>
             <a:endParaRPr lang="en-US"/>
           </a:p>
@@ -2739,7 +2739,7 @@
           <a:p>
             <a:fld id="{4251665B-C24A-4702-B522-6A4334602E03}" type="datetimeFigureOut">
               <a:rPr lang="en-US" smtClean="0"/>
-              <a:t>6/10/2016</a:t>
+              <a:t>6/14/2016</a:t>
             </a:fld>
             <a:endParaRPr lang="en-US"/>
           </a:p>
@@ -2948,7 +2948,7 @@
             <a:fld id="{8E36636D-D922-432D-A958-524484B5923D}" type="datetimeFigureOut">
               <a:rPr lang="en-US" smtClean="0"/>
               <a:pPr/>
-              <a:t>6/10/2016</a:t>
+              <a:t>6/14/2016</a:t>
             </a:fld>
             <a:endParaRPr lang="en-US"/>
           </a:p>
@@ -3284,7 +3284,7 @@
           <a:p>
             <a:fld id="{4251665B-C24A-4702-B522-6A4334602E03}" type="datetimeFigureOut">
               <a:rPr lang="en-US" smtClean="0"/>
-              <a:t>6/10/2016</a:t>
+              <a:t>6/14/2016</a:t>
             </a:fld>
             <a:endParaRPr lang="en-US"/>
           </a:p>
@@ -3560,7 +3560,7 @@
             <a:fld id="{8E36636D-D922-432D-A958-524484B5923D}" type="datetimeFigureOut">
               <a:rPr lang="en-US" smtClean="0"/>
               <a:pPr/>
-              <a:t>6/10/2016</a:t>
+              <a:t>6/14/2016</a:t>
             </a:fld>
             <a:endParaRPr lang="en-US"/>
           </a:p>
@@ -3941,7 +3941,7 @@
             <a:fld id="{8E36636D-D922-432D-A958-524484B5923D}" type="datetimeFigureOut">
               <a:rPr lang="en-US" smtClean="0"/>
               <a:pPr/>
-              <a:t>6/10/2016</a:t>
+              <a:t>6/14/2016</a:t>
             </a:fld>
             <a:endParaRPr lang="en-US"/>
           </a:p>
@@ -4061,7 +4061,7 @@
             <a:fld id="{8E36636D-D922-432D-A958-524484B5923D}" type="datetimeFigureOut">
               <a:rPr lang="en-US" smtClean="0"/>
               <a:pPr/>
-              <a:t>6/10/2016</a:t>
+              <a:t>6/14/2016</a:t>
             </a:fld>
             <a:endParaRPr lang="en-US"/>
           </a:p>
@@ -4234,7 +4234,7 @@
             <a:fld id="{8E36636D-D922-432D-A958-524484B5923D}" type="datetimeFigureOut">
               <a:rPr lang="en-US" smtClean="0"/>
               <a:pPr/>
-              <a:t>6/10/2016</a:t>
+              <a:t>6/14/2016</a:t>
             </a:fld>
             <a:endParaRPr lang="en-US"/>
           </a:p>
@@ -4590,7 +4590,7 @@
             <a:fld id="{8E36636D-D922-432D-A958-524484B5923D}" type="datetimeFigureOut">
               <a:rPr lang="en-US" smtClean="0"/>
               <a:pPr/>
-              <a:t>6/10/2016</a:t>
+              <a:t>6/14/2016</a:t>
             </a:fld>
             <a:endParaRPr lang="en-US"/>
           </a:p>
@@ -4783,7 +4783,7 @@
             <a:fld id="{8E36636D-D922-432D-A958-524484B5923D}" type="datetimeFigureOut">
               <a:rPr lang="en-US" smtClean="0"/>
               <a:pPr/>
-              <a:t>6/10/2016</a:t>
+              <a:t>6/14/2016</a:t>
             </a:fld>
             <a:endParaRPr lang="en-US"/>
           </a:p>
@@ -5141,7 +5141,7 @@
             <a:fld id="{8E36636D-D922-432D-A958-524484B5923D}" type="datetimeFigureOut">
               <a:rPr lang="en-US" smtClean="0"/>
               <a:pPr/>
-              <a:t>6/10/2016</a:t>
+              <a:t>6/14/2016</a:t>
             </a:fld>
             <a:endParaRPr lang="en-US"/>
           </a:p>
@@ -5313,7 +5313,7 @@
             <a:fld id="{8E36636D-D922-432D-A958-524484B5923D}" type="datetimeFigureOut">
               <a:rPr lang="en-US" smtClean="0"/>
               <a:pPr/>
-              <a:t>6/10/2016</a:t>
+              <a:t>6/14/2016</a:t>
             </a:fld>
             <a:endParaRPr lang="en-US"/>
           </a:p>
@@ -5571,7 +5571,7 @@
             <a:fld id="{8E36636D-D922-432D-A958-524484B5923D}" type="datetimeFigureOut">
               <a:rPr lang="en-US" smtClean="0"/>
               <a:pPr/>
-              <a:t>6/10/2016</a:t>
+              <a:t>6/14/2016</a:t>
             </a:fld>
             <a:endParaRPr lang="en-US"/>
           </a:p>
@@ -5823,7 +5823,7 @@
           <a:p>
             <a:fld id="{4251665B-C24A-4702-B522-6A4334602E03}" type="datetimeFigureOut">
               <a:rPr lang="en-US" smtClean="0"/>
-              <a:t>6/10/2016</a:t>
+              <a:t>6/14/2016</a:t>
             </a:fld>
             <a:endParaRPr lang="en-US"/>
           </a:p>
@@ -6056,7 +6056,7 @@
             <a:fld id="{8E36636D-D922-432D-A958-524484B5923D}" type="datetimeFigureOut">
               <a:rPr lang="en-US" smtClean="0"/>
               <a:pPr/>
-              <a:t>6/10/2016</a:t>
+              <a:t>6/14/2016</a:t>
             </a:fld>
             <a:endParaRPr lang="en-US"/>
           </a:p>
@@ -6405,7 +6405,7 @@
             <a:fld id="{8E36636D-D922-432D-A958-524484B5923D}" type="datetimeFigureOut">
               <a:rPr lang="en-US" smtClean="0"/>
               <a:pPr/>
-              <a:t>6/10/2016</a:t>
+              <a:t>6/14/2016</a:t>
             </a:fld>
             <a:endParaRPr lang="en-US"/>
           </a:p>
@@ -6525,7 +6525,7 @@
             <a:fld id="{8E36636D-D922-432D-A958-524484B5923D}" type="datetimeFigureOut">
               <a:rPr lang="en-US" smtClean="0"/>
               <a:pPr/>
-              <a:t>6/10/2016</a:t>
+              <a:t>6/14/2016</a:t>
             </a:fld>
             <a:endParaRPr lang="en-US"/>
           </a:p>
@@ -6645,7 +6645,7 @@
             <a:fld id="{8E36636D-D922-432D-A958-524484B5923D}" type="datetimeFigureOut">
               <a:rPr lang="en-US" smtClean="0"/>
               <a:pPr/>
-              <a:t>6/10/2016</a:t>
+              <a:t>6/14/2016</a:t>
             </a:fld>
             <a:endParaRPr lang="en-US"/>
           </a:p>
@@ -6931,7 +6931,7 @@
             <a:fld id="{8E36636D-D922-432D-A958-524484B5923D}" type="datetimeFigureOut">
               <a:rPr lang="en-US" smtClean="0"/>
               <a:pPr/>
-              <a:t>6/10/2016</a:t>
+              <a:t>6/14/2016</a:t>
             </a:fld>
             <a:endParaRPr lang="en-US"/>
           </a:p>
@@ -7197,7 +7197,7 @@
             <a:fld id="{8E36636D-D922-432D-A958-524484B5923D}" type="datetimeFigureOut">
               <a:rPr lang="en-US" smtClean="0"/>
               <a:pPr/>
-              <a:t>6/10/2016</a:t>
+              <a:t>6/14/2016</a:t>
             </a:fld>
             <a:endParaRPr lang="en-US"/>
           </a:p>
@@ -7413,7 +7413,7 @@
             <a:fld id="{8E36636D-D922-432D-A958-524484B5923D}" type="datetimeFigureOut">
               <a:rPr lang="en-US" smtClean="0"/>
               <a:pPr/>
-              <a:t>6/10/2016</a:t>
+              <a:t>6/14/2016</a:t>
             </a:fld>
             <a:endParaRPr lang="en-US"/>
           </a:p>
@@ -8018,7 +8018,7 @@
             <a:fld id="{8E36636D-D922-432D-A958-524484B5923D}" type="datetimeFigureOut">
               <a:rPr lang="en-US" smtClean="0"/>
               <a:pPr/>
-              <a:t>6/10/2016</a:t>
+              <a:t>6/14/2016</a:t>
             </a:fld>
             <a:endParaRPr lang="en-US"/>
           </a:p>
@@ -9365,21 +9365,8 @@
                   <a:schemeClr val="tx1"/>
                 </a:solidFill>
               </a:rPr>
-              <a:t> </a:t>
-            </a:r>
-            <a:r>
-              <a:rPr lang="en-US" dirty="0" smtClean="0">
-                <a:solidFill>
-                  <a:schemeClr val="tx1"/>
-                </a:solidFill>
-              </a:rPr>
-              <a:t>commit –m “commit message”</a:t>
-            </a:r>
-            <a:endParaRPr lang="en-US" dirty="0" smtClean="0">
-              <a:solidFill>
-                <a:schemeClr val="tx1"/>
-              </a:solidFill>
-            </a:endParaRPr>
+              <a:t> commit –m “commit message”</a:t>
+            </a:r>
           </a:p>
           <a:p>
             <a:pPr marL="201168" lvl="1" indent="0">
@@ -12141,7 +12128,9 @@
         </p:nvSpPr>
         <p:spPr/>
         <p:txBody>
-          <a:bodyPr/>
+          <a:bodyPr>
+            <a:normAutofit fontScale="92500" lnSpcReduction="10000"/>
+          </a:bodyPr>
           <a:lstStyle/>
           <a:p>
             <a:r>
@@ -12203,6 +12192,33 @@
               <a:rPr lang="en-US" dirty="0" smtClean="0"/>
               <a:t>command</a:t>
             </a:r>
+          </a:p>
+          <a:p>
+            <a:r>
+              <a:rPr lang="en-US" dirty="0" smtClean="0"/>
+              <a:t># Try using ‘</a:t>
+            </a:r>
+            <a:r>
+              <a:rPr lang="en-US" dirty="0" err="1" smtClean="0"/>
+              <a:t>samtools</a:t>
+            </a:r>
+            <a:r>
+              <a:rPr lang="en-US" dirty="0" smtClean="0"/>
+              <a:t> view </a:t>
+            </a:r>
+            <a:r>
+              <a:rPr lang="en-US" dirty="0" err="1" smtClean="0"/>
+              <a:t>celegans.bam</a:t>
+            </a:r>
+            <a:r>
+              <a:rPr lang="en-US" dirty="0" smtClean="0"/>
+              <a:t> | head –n 10’ to view </a:t>
+            </a:r>
+            <a:r>
+              <a:rPr lang="en-US" dirty="0" err="1" smtClean="0"/>
+              <a:t>celegans.bam</a:t>
+            </a:r>
+            <a:endParaRPr lang="en-US" dirty="0" smtClean="0"/>
           </a:p>
           <a:p>
             <a:endParaRPr lang="en-US" dirty="0"/>
@@ -12954,10 +12970,10 @@
           <a:p>
             <a:pPr lvl="1"/>
             <a:r>
-              <a:rPr lang="en-US" sz="2400" dirty="0" smtClean="0">
+              <a:rPr lang="en-US" sz="2400" dirty="0" err="1" smtClean="0">
                 <a:hlinkClick r:id="rId7"/>
               </a:rPr>
-              <a:t>BAMtools</a:t>
+              <a:t>BamTools</a:t>
             </a:r>
             <a:endParaRPr lang="en-US" sz="2400" dirty="0"/>
           </a:p>
@@ -13127,7 +13143,7 @@
               <a:t>Splice-aware mapping, </a:t>
             </a:r>
             <a:r>
-              <a:rPr lang="en-US" sz="2400" dirty="0" err="1" smtClean="0">
+              <a:rPr lang="en-US" sz="2400" dirty="0" smtClean="0">
                 <a:hlinkClick r:id="rId4"/>
               </a:rPr>
               <a:t>Tophat</a:t>

</xml_diff>